<commit_message>
Feature #1 - Add logo - Add menu buttons
</commit_message>
<xml_diff>
--- a/design_sheet/Feature_Design_#1.pptx
+++ b/design_sheet/Feature_Design_#1.pptx
@@ -6,6 +6,7 @@
   </p:sldMasterIdLst>
   <p:sldIdLst>
     <p:sldId id="256" r:id="rId2"/>
+    <p:sldId id="257" r:id="rId3"/>
   </p:sldIdLst>
   <p:sldSz cx="12192000" cy="6858000"/>
   <p:notesSz cx="6858000" cy="9144000"/>
@@ -270,7 +271,7 @@
           <a:p>
             <a:fld id="{AA631890-586A-984C-8B67-774F62D7F95E}" type="datetimeFigureOut">
               <a:rPr kumimoji="1" lang="ko-KR" altLang="en-US" smtClean="0"/>
-              <a:t>2022. 5. 16.</a:t>
+              <a:t>2022. 5. 17.</a:t>
             </a:fld>
             <a:endParaRPr kumimoji="1" lang="ko-KR" altLang="en-US"/>
           </a:p>
@@ -468,7 +469,7 @@
           <a:p>
             <a:fld id="{AA631890-586A-984C-8B67-774F62D7F95E}" type="datetimeFigureOut">
               <a:rPr kumimoji="1" lang="ko-KR" altLang="en-US" smtClean="0"/>
-              <a:t>2022. 5. 16.</a:t>
+              <a:t>2022. 5. 17.</a:t>
             </a:fld>
             <a:endParaRPr kumimoji="1" lang="ko-KR" altLang="en-US"/>
           </a:p>
@@ -676,7 +677,7 @@
           <a:p>
             <a:fld id="{AA631890-586A-984C-8B67-774F62D7F95E}" type="datetimeFigureOut">
               <a:rPr kumimoji="1" lang="ko-KR" altLang="en-US" smtClean="0"/>
-              <a:t>2022. 5. 16.</a:t>
+              <a:t>2022. 5. 17.</a:t>
             </a:fld>
             <a:endParaRPr kumimoji="1" lang="ko-KR" altLang="en-US"/>
           </a:p>
@@ -874,7 +875,7 @@
           <a:p>
             <a:fld id="{AA631890-586A-984C-8B67-774F62D7F95E}" type="datetimeFigureOut">
               <a:rPr kumimoji="1" lang="ko-KR" altLang="en-US" smtClean="0"/>
-              <a:t>2022. 5. 16.</a:t>
+              <a:t>2022. 5. 17.</a:t>
             </a:fld>
             <a:endParaRPr kumimoji="1" lang="ko-KR" altLang="en-US"/>
           </a:p>
@@ -1149,7 +1150,7 @@
           <a:p>
             <a:fld id="{AA631890-586A-984C-8B67-774F62D7F95E}" type="datetimeFigureOut">
               <a:rPr kumimoji="1" lang="ko-KR" altLang="en-US" smtClean="0"/>
-              <a:t>2022. 5. 16.</a:t>
+              <a:t>2022. 5. 17.</a:t>
             </a:fld>
             <a:endParaRPr kumimoji="1" lang="ko-KR" altLang="en-US"/>
           </a:p>
@@ -1414,7 +1415,7 @@
           <a:p>
             <a:fld id="{AA631890-586A-984C-8B67-774F62D7F95E}" type="datetimeFigureOut">
               <a:rPr kumimoji="1" lang="ko-KR" altLang="en-US" smtClean="0"/>
-              <a:t>2022. 5. 16.</a:t>
+              <a:t>2022. 5. 17.</a:t>
             </a:fld>
             <a:endParaRPr kumimoji="1" lang="ko-KR" altLang="en-US"/>
           </a:p>
@@ -1826,7 +1827,7 @@
           <a:p>
             <a:fld id="{AA631890-586A-984C-8B67-774F62D7F95E}" type="datetimeFigureOut">
               <a:rPr kumimoji="1" lang="ko-KR" altLang="en-US" smtClean="0"/>
-              <a:t>2022. 5. 16.</a:t>
+              <a:t>2022. 5. 17.</a:t>
             </a:fld>
             <a:endParaRPr kumimoji="1" lang="ko-KR" altLang="en-US"/>
           </a:p>
@@ -1967,7 +1968,7 @@
           <a:p>
             <a:fld id="{AA631890-586A-984C-8B67-774F62D7F95E}" type="datetimeFigureOut">
               <a:rPr kumimoji="1" lang="ko-KR" altLang="en-US" smtClean="0"/>
-              <a:t>2022. 5. 16.</a:t>
+              <a:t>2022. 5. 17.</a:t>
             </a:fld>
             <a:endParaRPr kumimoji="1" lang="ko-KR" altLang="en-US"/>
           </a:p>
@@ -2080,7 +2081,7 @@
           <a:p>
             <a:fld id="{AA631890-586A-984C-8B67-774F62D7F95E}" type="datetimeFigureOut">
               <a:rPr kumimoji="1" lang="ko-KR" altLang="en-US" smtClean="0"/>
-              <a:t>2022. 5. 16.</a:t>
+              <a:t>2022. 5. 17.</a:t>
             </a:fld>
             <a:endParaRPr kumimoji="1" lang="ko-KR" altLang="en-US"/>
           </a:p>
@@ -2391,7 +2392,7 @@
           <a:p>
             <a:fld id="{AA631890-586A-984C-8B67-774F62D7F95E}" type="datetimeFigureOut">
               <a:rPr kumimoji="1" lang="ko-KR" altLang="en-US" smtClean="0"/>
-              <a:t>2022. 5. 16.</a:t>
+              <a:t>2022. 5. 17.</a:t>
             </a:fld>
             <a:endParaRPr kumimoji="1" lang="ko-KR" altLang="en-US"/>
           </a:p>
@@ -2679,7 +2680,7 @@
           <a:p>
             <a:fld id="{AA631890-586A-984C-8B67-774F62D7F95E}" type="datetimeFigureOut">
               <a:rPr kumimoji="1" lang="ko-KR" altLang="en-US" smtClean="0"/>
-              <a:t>2022. 5. 16.</a:t>
+              <a:t>2022. 5. 17.</a:t>
             </a:fld>
             <a:endParaRPr kumimoji="1" lang="ko-KR" altLang="en-US"/>
           </a:p>
@@ -2920,7 +2921,7 @@
           <a:p>
             <a:fld id="{AA631890-586A-984C-8B67-774F62D7F95E}" type="datetimeFigureOut">
               <a:rPr kumimoji="1" lang="ko-KR" altLang="en-US" smtClean="0"/>
-              <a:t>2022. 5. 16.</a:t>
+              <a:t>2022. 5. 17.</a:t>
             </a:fld>
             <a:endParaRPr kumimoji="1" lang="ko-KR" altLang="en-US"/>
           </a:p>
@@ -4555,6 +4556,168 @@
 </p:sld>
 </file>
 
+<file path=ppt/slides/slide2.xml><?xml version="1.0" encoding="utf-8"?>
+<p:sld xmlns:a="http://schemas.openxmlformats.org/drawingml/2006/main" xmlns:r="http://schemas.openxmlformats.org/officeDocument/2006/relationships" xmlns:p="http://schemas.openxmlformats.org/presentationml/2006/main">
+  <p:cSld>
+    <p:spTree>
+      <p:nvGrpSpPr>
+        <p:cNvPr id="1" name=""/>
+        <p:cNvGrpSpPr/>
+        <p:nvPr/>
+      </p:nvGrpSpPr>
+      <p:grpSpPr>
+        <a:xfrm>
+          <a:off x="0" y="0"/>
+          <a:ext cx="0" cy="0"/>
+          <a:chOff x="0" y="0"/>
+          <a:chExt cx="0" cy="0"/>
+        </a:xfrm>
+      </p:grpSpPr>
+      <p:grpSp>
+        <p:nvGrpSpPr>
+          <p:cNvPr id="11" name="그룹 10">
+            <a:extLst>
+              <a:ext uri="{FF2B5EF4-FFF2-40B4-BE49-F238E27FC236}">
+                <a16:creationId xmlns:a16="http://schemas.microsoft.com/office/drawing/2014/main" id="{87CED45C-BB24-8948-2BF4-962FB0A19D7F}"/>
+              </a:ext>
+            </a:extLst>
+          </p:cNvPr>
+          <p:cNvGrpSpPr/>
+          <p:nvPr/>
+        </p:nvGrpSpPr>
+        <p:grpSpPr>
+          <a:xfrm>
+            <a:off x="3973790" y="1566411"/>
+            <a:ext cx="4564665" cy="3532870"/>
+            <a:chOff x="3973790" y="1566411"/>
+            <a:chExt cx="4564665" cy="3532870"/>
+          </a:xfrm>
+        </p:grpSpPr>
+        <p:grpSp>
+          <p:nvGrpSpPr>
+            <p:cNvPr id="9" name="그룹 8">
+              <a:extLst>
+                <a:ext uri="{FF2B5EF4-FFF2-40B4-BE49-F238E27FC236}">
+                  <a16:creationId xmlns:a16="http://schemas.microsoft.com/office/drawing/2014/main" id="{57E69773-723B-A6B1-334B-B820C6892AFB}"/>
+                </a:ext>
+              </a:extLst>
+            </p:cNvPr>
+            <p:cNvGrpSpPr/>
+            <p:nvPr/>
+          </p:nvGrpSpPr>
+          <p:grpSpPr>
+            <a:xfrm>
+              <a:off x="4042546" y="1566411"/>
+              <a:ext cx="4106907" cy="2838107"/>
+              <a:chOff x="1212850" y="695925"/>
+              <a:chExt cx="4106907" cy="2838107"/>
+            </a:xfrm>
+          </p:grpSpPr>
+          <p:pic>
+            <p:nvPicPr>
+              <p:cNvPr id="5" name="그림 4">
+                <a:extLst>
+                  <a:ext uri="{FF2B5EF4-FFF2-40B4-BE49-F238E27FC236}">
+                    <a16:creationId xmlns:a16="http://schemas.microsoft.com/office/drawing/2014/main" id="{380606F1-16A8-92C0-D04A-AC17E98A5018}"/>
+                  </a:ext>
+                </a:extLst>
+              </p:cNvPr>
+              <p:cNvPicPr>
+                <a:picLocks noChangeAspect="1"/>
+              </p:cNvPicPr>
+              <p:nvPr/>
+            </p:nvPicPr>
+            <p:blipFill>
+              <a:blip r:embed="rId2"/>
+              <a:stretch>
+                <a:fillRect/>
+              </a:stretch>
+            </p:blipFill>
+            <p:spPr>
+              <a:xfrm>
+                <a:off x="1212850" y="695925"/>
+                <a:ext cx="2838107" cy="2838107"/>
+              </a:xfrm>
+              <a:prstGeom prst="rect">
+                <a:avLst/>
+              </a:prstGeom>
+            </p:spPr>
+          </p:pic>
+          <p:pic>
+            <p:nvPicPr>
+              <p:cNvPr id="7" name="그림 6">
+                <a:extLst>
+                  <a:ext uri="{FF2B5EF4-FFF2-40B4-BE49-F238E27FC236}">
+                    <a16:creationId xmlns:a16="http://schemas.microsoft.com/office/drawing/2014/main" id="{94E6FCC8-056C-B03C-D881-4B2E624B4D1E}"/>
+                  </a:ext>
+                </a:extLst>
+              </p:cNvPr>
+              <p:cNvPicPr>
+                <a:picLocks noChangeAspect="1"/>
+              </p:cNvPicPr>
+              <p:nvPr/>
+            </p:nvPicPr>
+            <p:blipFill>
+              <a:blip r:embed="rId3"/>
+              <a:stretch>
+                <a:fillRect/>
+              </a:stretch>
+            </p:blipFill>
+            <p:spPr>
+              <a:xfrm>
+                <a:off x="3426427" y="1368854"/>
+                <a:ext cx="1893330" cy="1893330"/>
+              </a:xfrm>
+              <a:prstGeom prst="rect">
+                <a:avLst/>
+              </a:prstGeom>
+            </p:spPr>
+          </p:pic>
+        </p:grpSp>
+        <p:pic>
+          <p:nvPicPr>
+            <p:cNvPr id="10" name="그림 9">
+              <a:extLst>
+                <a:ext uri="{FF2B5EF4-FFF2-40B4-BE49-F238E27FC236}">
+                  <a16:creationId xmlns:a16="http://schemas.microsoft.com/office/drawing/2014/main" id="{3C6FF59F-DB98-CD78-02F5-6E03D969CB2C}"/>
+                </a:ext>
+              </a:extLst>
+            </p:cNvPr>
+            <p:cNvPicPr>
+              <a:picLocks noChangeAspect="1"/>
+            </p:cNvPicPr>
+            <p:nvPr/>
+          </p:nvPicPr>
+          <p:blipFill>
+            <a:blip r:embed="rId4"/>
+            <a:stretch>
+              <a:fillRect/>
+            </a:stretch>
+          </p:blipFill>
+          <p:spPr>
+            <a:xfrm>
+              <a:off x="3973790" y="4511916"/>
+              <a:ext cx="4564665" cy="587365"/>
+            </a:xfrm>
+            <a:prstGeom prst="rect">
+              <a:avLst/>
+            </a:prstGeom>
+          </p:spPr>
+        </p:pic>
+      </p:grpSp>
+    </p:spTree>
+    <p:extLst>
+      <p:ext uri="{BB962C8B-B14F-4D97-AF65-F5344CB8AC3E}">
+        <p14:creationId xmlns:p14="http://schemas.microsoft.com/office/powerpoint/2010/main" val="3554276367"/>
+      </p:ext>
+    </p:extLst>
+  </p:cSld>
+  <p:clrMapOvr>
+    <a:masterClrMapping/>
+  </p:clrMapOvr>
+</p:sld>
+</file>
+
 <file path=ppt/theme/theme1.xml><?xml version="1.0" encoding="utf-8"?>
 <a:theme xmlns:a="http://schemas.openxmlformats.org/drawingml/2006/main" name="Office 테마">
   <a:themeElements>

</xml_diff>